<commit_message>
finished the markov chains assignment except for the random walks. Had no idea how it worked using the starter example jeff gave
</commit_message>
<xml_diff>
--- a/Revised-DataMiningPoster.pptx
+++ b/Revised-DataMiningPoster.pptx
@@ -303,7 +303,7 @@
             <a:fld id="{6E4CEA9A-37A9-48AB-B3C1-DBCDC4B264FB}" type="datetimeFigureOut">
               <a:rPr lang="en-US" smtClean="0"/>
               <a:pPr/>
-              <a:t>4/18/2020</a:t>
+              <a:t>4/21/2020</a:t>
             </a:fld>
             <a:endParaRPr lang="en-US"/>
           </a:p>
@@ -473,7 +473,7 @@
             <a:fld id="{6E4CEA9A-37A9-48AB-B3C1-DBCDC4B264FB}" type="datetimeFigureOut">
               <a:rPr lang="en-US" smtClean="0"/>
               <a:pPr/>
-              <a:t>4/18/2020</a:t>
+              <a:t>4/21/2020</a:t>
             </a:fld>
             <a:endParaRPr lang="en-US"/>
           </a:p>
@@ -653,7 +653,7 @@
             <a:fld id="{6E4CEA9A-37A9-48AB-B3C1-DBCDC4B264FB}" type="datetimeFigureOut">
               <a:rPr lang="en-US" smtClean="0"/>
               <a:pPr/>
-              <a:t>4/18/2020</a:t>
+              <a:t>4/21/2020</a:t>
             </a:fld>
             <a:endParaRPr lang="en-US"/>
           </a:p>
@@ -823,7 +823,7 @@
             <a:fld id="{6E4CEA9A-37A9-48AB-B3C1-DBCDC4B264FB}" type="datetimeFigureOut">
               <a:rPr lang="en-US" smtClean="0"/>
               <a:pPr/>
-              <a:t>4/18/2020</a:t>
+              <a:t>4/21/2020</a:t>
             </a:fld>
             <a:endParaRPr lang="en-US"/>
           </a:p>
@@ -1070,7 +1070,7 @@
             <a:fld id="{6E4CEA9A-37A9-48AB-B3C1-DBCDC4B264FB}" type="datetimeFigureOut">
               <a:rPr lang="en-US" smtClean="0"/>
               <a:pPr/>
-              <a:t>4/18/2020</a:t>
+              <a:t>4/21/2020</a:t>
             </a:fld>
             <a:endParaRPr lang="en-US"/>
           </a:p>
@@ -1357,7 +1357,7 @@
             <a:fld id="{6E4CEA9A-37A9-48AB-B3C1-DBCDC4B264FB}" type="datetimeFigureOut">
               <a:rPr lang="en-US" smtClean="0"/>
               <a:pPr/>
-              <a:t>4/18/2020</a:t>
+              <a:t>4/21/2020</a:t>
             </a:fld>
             <a:endParaRPr lang="en-US"/>
           </a:p>
@@ -1778,7 +1778,7 @@
             <a:fld id="{6E4CEA9A-37A9-48AB-B3C1-DBCDC4B264FB}" type="datetimeFigureOut">
               <a:rPr lang="en-US" smtClean="0"/>
               <a:pPr/>
-              <a:t>4/18/2020</a:t>
+              <a:t>4/21/2020</a:t>
             </a:fld>
             <a:endParaRPr lang="en-US"/>
           </a:p>
@@ -1897,7 +1897,7 @@
             <a:fld id="{6E4CEA9A-37A9-48AB-B3C1-DBCDC4B264FB}" type="datetimeFigureOut">
               <a:rPr lang="en-US" smtClean="0"/>
               <a:pPr/>
-              <a:t>4/18/2020</a:t>
+              <a:t>4/21/2020</a:t>
             </a:fld>
             <a:endParaRPr lang="en-US"/>
           </a:p>
@@ -1994,7 +1994,7 @@
             <a:fld id="{6E4CEA9A-37A9-48AB-B3C1-DBCDC4B264FB}" type="datetimeFigureOut">
               <a:rPr lang="en-US" smtClean="0"/>
               <a:pPr/>
-              <a:t>4/18/2020</a:t>
+              <a:t>4/21/2020</a:t>
             </a:fld>
             <a:endParaRPr lang="en-US"/>
           </a:p>
@@ -2271,7 +2271,7 @@
             <a:fld id="{6E4CEA9A-37A9-48AB-B3C1-DBCDC4B264FB}" type="datetimeFigureOut">
               <a:rPr lang="en-US" smtClean="0"/>
               <a:pPr/>
-              <a:t>4/18/2020</a:t>
+              <a:t>4/21/2020</a:t>
             </a:fld>
             <a:endParaRPr lang="en-US"/>
           </a:p>
@@ -2525,7 +2525,7 @@
             <a:fld id="{6E4CEA9A-37A9-48AB-B3C1-DBCDC4B264FB}" type="datetimeFigureOut">
               <a:rPr lang="en-US" smtClean="0"/>
               <a:pPr/>
-              <a:t>4/18/2020</a:t>
+              <a:t>4/21/2020</a:t>
             </a:fld>
             <a:endParaRPr lang="en-US"/>
           </a:p>
@@ -2738,7 +2738,7 @@
             <a:fld id="{6E4CEA9A-37A9-48AB-B3C1-DBCDC4B264FB}" type="datetimeFigureOut">
               <a:rPr lang="en-US" smtClean="0"/>
               <a:pPr/>
-              <a:t>4/18/2020</a:t>
+              <a:t>4/21/2020</a:t>
             </a:fld>
             <a:endParaRPr lang="en-US"/>
           </a:p>
@@ -4084,8 +4084,8 @@
         </p:blipFill>
         <p:spPr bwMode="auto">
           <a:xfrm>
-            <a:off x="504019" y="21557397"/>
-            <a:ext cx="13250081" cy="10599003"/>
+            <a:off x="226058" y="21926343"/>
+            <a:ext cx="13867325" cy="8686792"/>
           </a:xfrm>
           <a:prstGeom prst="rect">
             <a:avLst/>
@@ -4417,8 +4417,8 @@
         </p:blipFill>
         <p:spPr bwMode="auto">
           <a:xfrm>
-            <a:off x="29438601" y="9508867"/>
-            <a:ext cx="14296791" cy="10172970"/>
+            <a:off x="29382785" y="10494731"/>
+            <a:ext cx="13997220" cy="7994844"/>
           </a:xfrm>
           <a:prstGeom prst="rect">
             <a:avLst/>
@@ -4734,6 +4734,61 @@
 </file>
 
 <file path=customXml/item1.xml><?xml version="1.0" encoding="utf-8"?>
+<?mso-contentType ?>
+<FormTemplates xmlns="http://schemas.microsoft.com/sharepoint/v3/contenttype/forms">
+  <Display>DocumentLibraryForm</Display>
+  <Edit>DocumentLibraryForm</Edit>
+  <New>DocumentLibraryForm</New>
+</FormTemplates>
+</file>
+
+<file path=customXml/item2.xml><?xml version="1.0" encoding="utf-8"?>
+<?mso-contentType ?>
+<spe:Receivers xmlns:spe="http://schemas.microsoft.com/sharepoint/events">
+  <Receiver>
+    <Name>Document ID Generator</Name>
+    <Synchronization>Synchronous</Synchronization>
+    <Type>10001</Type>
+    <SequenceNumber>1000</SequenceNumber>
+    <Assembly>Microsoft.Office.DocumentManagement, Version=14.0.0.0, Culture=neutral, PublicKeyToken=71e9bce111e9429c</Assembly>
+    <Class>Microsoft.Office.DocumentManagement.Internal.DocIdHandler</Class>
+    <Data/>
+    <Filter/>
+  </Receiver>
+  <Receiver>
+    <Name>Document ID Generator</Name>
+    <Synchronization>Synchronous</Synchronization>
+    <Type>10002</Type>
+    <SequenceNumber>1001</SequenceNumber>
+    <Assembly>Microsoft.Office.DocumentManagement, Version=14.0.0.0, Culture=neutral, PublicKeyToken=71e9bce111e9429c</Assembly>
+    <Class>Microsoft.Office.DocumentManagement.Internal.DocIdHandler</Class>
+    <Data/>
+    <Filter/>
+  </Receiver>
+  <Receiver>
+    <Name>Document ID Generator</Name>
+    <Synchronization>Synchronous</Synchronization>
+    <Type>10004</Type>
+    <SequenceNumber>1002</SequenceNumber>
+    <Assembly>Microsoft.Office.DocumentManagement, Version=14.0.0.0, Culture=neutral, PublicKeyToken=71e9bce111e9429c</Assembly>
+    <Class>Microsoft.Office.DocumentManagement.Internal.DocIdHandler</Class>
+    <Data/>
+    <Filter/>
+  </Receiver>
+  <Receiver>
+    <Name>Document ID Generator</Name>
+    <Synchronization>Synchronous</Synchronization>
+    <Type>10006</Type>
+    <SequenceNumber>1003</SequenceNumber>
+    <Assembly>Microsoft.Office.DocumentManagement, Version=14.0.0.0, Culture=neutral, PublicKeyToken=71e9bce111e9429c</Assembly>
+    <Class>Microsoft.Office.DocumentManagement.Internal.DocIdHandler</Class>
+    <Data/>
+    <Filter/>
+  </Receiver>
+</spe:Receivers>
+</file>
+
+<file path=customXml/item3.xml><?xml version="1.0" encoding="utf-8"?>
 <ct:contentTypeSchema xmlns:ct="http://schemas.microsoft.com/office/2006/metadata/contentType" xmlns:ma="http://schemas.microsoft.com/office/2006/metadata/properties/metaAttributes" ct:_="" ma:_="" ma:contentTypeName="Document" ma:contentTypeID="0x010100198492E96F6ACC44BBBEB5EFA434EED1" ma:contentTypeVersion="1" ma:contentTypeDescription="Create a new document." ma:contentTypeScope="" ma:versionID="cf296b60bf990032323d1c6d41ae543b">
   <xsd:schema xmlns:xsd="http://www.w3.org/2001/XMLSchema" xmlns:xs="http://www.w3.org/2001/XMLSchema" xmlns:p="http://schemas.microsoft.com/office/2006/metadata/properties" xmlns:ns2="db534a5e-1222-4db9-a6da-47c142019016" targetNamespace="http://schemas.microsoft.com/office/2006/metadata/properties" ma:root="true" ma:fieldsID="491b76b6be48514c30ba3200299e7b7f" ns2:_="">
     <xsd:import namespace="db534a5e-1222-4db9-a6da-47c142019016"/>
@@ -4878,61 +4933,6 @@
 </ct:contentTypeSchema>
 </file>
 
-<file path=customXml/item2.xml><?xml version="1.0" encoding="utf-8"?>
-<?mso-contentType ?>
-<spe:Receivers xmlns:spe="http://schemas.microsoft.com/sharepoint/events">
-  <Receiver>
-    <Name>Document ID Generator</Name>
-    <Synchronization>Synchronous</Synchronization>
-    <Type>10001</Type>
-    <SequenceNumber>1000</SequenceNumber>
-    <Assembly>Microsoft.Office.DocumentManagement, Version=14.0.0.0, Culture=neutral, PublicKeyToken=71e9bce111e9429c</Assembly>
-    <Class>Microsoft.Office.DocumentManagement.Internal.DocIdHandler</Class>
-    <Data/>
-    <Filter/>
-  </Receiver>
-  <Receiver>
-    <Name>Document ID Generator</Name>
-    <Synchronization>Synchronous</Synchronization>
-    <Type>10002</Type>
-    <SequenceNumber>1001</SequenceNumber>
-    <Assembly>Microsoft.Office.DocumentManagement, Version=14.0.0.0, Culture=neutral, PublicKeyToken=71e9bce111e9429c</Assembly>
-    <Class>Microsoft.Office.DocumentManagement.Internal.DocIdHandler</Class>
-    <Data/>
-    <Filter/>
-  </Receiver>
-  <Receiver>
-    <Name>Document ID Generator</Name>
-    <Synchronization>Synchronous</Synchronization>
-    <Type>10004</Type>
-    <SequenceNumber>1002</SequenceNumber>
-    <Assembly>Microsoft.Office.DocumentManagement, Version=14.0.0.0, Culture=neutral, PublicKeyToken=71e9bce111e9429c</Assembly>
-    <Class>Microsoft.Office.DocumentManagement.Internal.DocIdHandler</Class>
-    <Data/>
-    <Filter/>
-  </Receiver>
-  <Receiver>
-    <Name>Document ID Generator</Name>
-    <Synchronization>Synchronous</Synchronization>
-    <Type>10006</Type>
-    <SequenceNumber>1003</SequenceNumber>
-    <Assembly>Microsoft.Office.DocumentManagement, Version=14.0.0.0, Culture=neutral, PublicKeyToken=71e9bce111e9429c</Assembly>
-    <Class>Microsoft.Office.DocumentManagement.Internal.DocIdHandler</Class>
-    <Data/>
-    <Filter/>
-  </Receiver>
-</spe:Receivers>
-</file>
-
-<file path=customXml/item3.xml><?xml version="1.0" encoding="utf-8"?>
-<?mso-contentType ?>
-<FormTemplates xmlns="http://schemas.microsoft.com/sharepoint/v3/contenttype/forms">
-  <Display>DocumentLibraryForm</Display>
-  <Edit>DocumentLibraryForm</Edit>
-  <New>DocumentLibraryForm</New>
-</FormTemplates>
-</file>
-
 <file path=customXml/item4.xml><?xml version="1.0" encoding="utf-8"?>
 <p:properties xmlns:p="http://schemas.microsoft.com/office/2006/metadata/properties" xmlns:xsi="http://www.w3.org/2001/XMLSchema-instance" xmlns:pc="http://schemas.microsoft.com/office/infopath/2007/PartnerControls">
   <documentManagement>
@@ -4946,6 +4946,22 @@
 </file>
 
 <file path=customXml/itemProps1.xml><?xml version="1.0" encoding="utf-8"?>
+<ds:datastoreItem xmlns:ds="http://schemas.openxmlformats.org/officeDocument/2006/customXml" ds:itemID="{507C3C16-BC59-4883-ABE4-0911E3FE1B90}">
+  <ds:schemaRefs>
+    <ds:schemaRef ds:uri="http://schemas.microsoft.com/sharepoint/v3/contenttype/forms"/>
+  </ds:schemaRefs>
+</ds:datastoreItem>
+</file>
+
+<file path=customXml/itemProps2.xml><?xml version="1.0" encoding="utf-8"?>
+<ds:datastoreItem xmlns:ds="http://schemas.openxmlformats.org/officeDocument/2006/customXml" ds:itemID="{CA62BF48-A576-4D85-A587-1744F931CE21}">
+  <ds:schemaRefs>
+    <ds:schemaRef ds:uri="http://schemas.microsoft.com/sharepoint/events"/>
+  </ds:schemaRefs>
+</ds:datastoreItem>
+</file>
+
+<file path=customXml/itemProps3.xml><?xml version="1.0" encoding="utf-8"?>
 <ds:datastoreItem xmlns:ds="http://schemas.openxmlformats.org/officeDocument/2006/customXml" ds:itemID="{081FD53D-2ABA-4B69-925F-BDB723FA0A79}">
   <ds:schemaRefs>
     <ds:schemaRef ds:uri="http://schemas.microsoft.com/office/2006/metadata/contentType"/>
@@ -4963,22 +4979,6 @@
 </ds:datastoreItem>
 </file>
 
-<file path=customXml/itemProps2.xml><?xml version="1.0" encoding="utf-8"?>
-<ds:datastoreItem xmlns:ds="http://schemas.openxmlformats.org/officeDocument/2006/customXml" ds:itemID="{CA62BF48-A576-4D85-A587-1744F931CE21}">
-  <ds:schemaRefs>
-    <ds:schemaRef ds:uri="http://schemas.microsoft.com/sharepoint/events"/>
-  </ds:schemaRefs>
-</ds:datastoreItem>
-</file>
-
-<file path=customXml/itemProps3.xml><?xml version="1.0" encoding="utf-8"?>
-<ds:datastoreItem xmlns:ds="http://schemas.openxmlformats.org/officeDocument/2006/customXml" ds:itemID="{507C3C16-BC59-4883-ABE4-0911E3FE1B90}">
-  <ds:schemaRefs>
-    <ds:schemaRef ds:uri="http://schemas.microsoft.com/sharepoint/v3/contenttype/forms"/>
-  </ds:schemaRefs>
-</ds:datastoreItem>
-</file>
-
 <file path=customXml/itemProps4.xml><?xml version="1.0" encoding="utf-8"?>
 <ds:datastoreItem xmlns:ds="http://schemas.openxmlformats.org/officeDocument/2006/customXml" ds:itemID="{188DB492-5879-4998-90FC-E865BEF428C1}">
   <ds:schemaRefs>

</xml_diff>

<commit_message>
finished the data mining poster updates
</commit_message>
<xml_diff>
--- a/Revised-DataMiningPoster.pptx
+++ b/Revised-DataMiningPoster.pptx
@@ -4255,100 +4255,6 @@
           </a:p>
         </p:txBody>
       </p:sp>
-      <p:pic>
-        <p:nvPicPr>
-          <p:cNvPr id="1028" name="Picture 4">
-            <a:extLst>
-              <a:ext uri="{FF2B5EF4-FFF2-40B4-BE49-F238E27FC236}">
-                <a16:creationId xmlns:a16="http://schemas.microsoft.com/office/drawing/2014/main" id="{6CF36AF3-B463-456C-8E2A-AFB0DA6AA2FE}"/>
-              </a:ext>
-            </a:extLst>
-          </p:cNvPr>
-          <p:cNvPicPr>
-            <a:picLocks noChangeAspect="1" noChangeArrowheads="1"/>
-          </p:cNvPicPr>
-          <p:nvPr/>
-        </p:nvPicPr>
-        <p:blipFill>
-          <a:blip r:embed="rId5">
-            <a:extLst>
-              <a:ext uri="{28A0092B-C50C-407E-A947-70E740481C1C}">
-                <a14:useLocalDpi xmlns:a14="http://schemas.microsoft.com/office/drawing/2010/main" val="0"/>
-              </a:ext>
-            </a:extLst>
-          </a:blip>
-          <a:srcRect/>
-          <a:stretch>
-            <a:fillRect/>
-          </a:stretch>
-        </p:blipFill>
-        <p:spPr bwMode="auto">
-          <a:xfrm>
-            <a:off x="14856457" y="13758353"/>
-            <a:ext cx="13898947" cy="8434393"/>
-          </a:xfrm>
-          <a:prstGeom prst="rect">
-            <a:avLst/>
-          </a:prstGeom>
-          <a:noFill/>
-          <a:extLst>
-            <a:ext uri="{909E8E84-426E-40DD-AFC4-6F175D3DCCD1}">
-              <a14:hiddenFill xmlns:a14="http://schemas.microsoft.com/office/drawing/2010/main">
-                <a:solidFill>
-                  <a:srgbClr val="FFFFFF"/>
-                </a:solidFill>
-              </a14:hiddenFill>
-            </a:ext>
-          </a:extLst>
-        </p:spPr>
-      </p:pic>
-      <p:pic>
-        <p:nvPicPr>
-          <p:cNvPr id="1030" name="Picture 6">
-            <a:extLst>
-              <a:ext uri="{FF2B5EF4-FFF2-40B4-BE49-F238E27FC236}">
-                <a16:creationId xmlns:a16="http://schemas.microsoft.com/office/drawing/2014/main" id="{ACDBD58C-84FE-4B7E-88F4-8CF07DAFAA09}"/>
-              </a:ext>
-            </a:extLst>
-          </p:cNvPr>
-          <p:cNvPicPr>
-            <a:picLocks noChangeAspect="1" noChangeArrowheads="1"/>
-          </p:cNvPicPr>
-          <p:nvPr/>
-        </p:nvPicPr>
-        <p:blipFill>
-          <a:blip r:embed="rId6">
-            <a:extLst>
-              <a:ext uri="{28A0092B-C50C-407E-A947-70E740481C1C}">
-                <a14:useLocalDpi xmlns:a14="http://schemas.microsoft.com/office/drawing/2010/main" val="0"/>
-              </a:ext>
-            </a:extLst>
-          </a:blip>
-          <a:srcRect/>
-          <a:stretch>
-            <a:fillRect/>
-          </a:stretch>
-        </p:blipFill>
-        <p:spPr bwMode="auto">
-          <a:xfrm>
-            <a:off x="15034197" y="22402801"/>
-            <a:ext cx="13791190" cy="10271760"/>
-          </a:xfrm>
-          <a:prstGeom prst="rect">
-            <a:avLst/>
-          </a:prstGeom>
-          <a:noFill/>
-          <a:extLst>
-            <a:ext uri="{909E8E84-426E-40DD-AFC4-6F175D3DCCD1}">
-              <a14:hiddenFill xmlns:a14="http://schemas.microsoft.com/office/drawing/2010/main">
-                <a:solidFill>
-                  <a:srgbClr val="FFFFFF"/>
-                </a:solidFill>
-              </a14:hiddenFill>
-            </a:ext>
-          </a:extLst>
-        </p:spPr>
-      </p:pic>
       <p:sp>
         <p:nvSpPr>
           <p:cNvPr id="52" name="TextBox 51">
@@ -4390,15 +4296,87 @@
       </p:sp>
       <p:pic>
         <p:nvPicPr>
-          <p:cNvPr id="1032" name="Picture 8">
+          <p:cNvPr id="3" name="Picture 2">
             <a:extLst>
               <a:ext uri="{FF2B5EF4-FFF2-40B4-BE49-F238E27FC236}">
-                <a16:creationId xmlns:a16="http://schemas.microsoft.com/office/drawing/2014/main" id="{AB308A05-3A15-4FED-9387-287B09D019BF}"/>
+                <a16:creationId xmlns:a16="http://schemas.microsoft.com/office/drawing/2014/main" id="{F56614F5-3182-4347-B7F3-2662DC6B5753}"/>
               </a:ext>
             </a:extLst>
           </p:cNvPr>
           <p:cNvPicPr>
-            <a:picLocks noChangeAspect="1" noChangeArrowheads="1"/>
+            <a:picLocks noChangeAspect="1"/>
+          </p:cNvPicPr>
+          <p:nvPr/>
+        </p:nvPicPr>
+        <p:blipFill>
+          <a:blip r:embed="rId5">
+            <a:extLst>
+              <a:ext uri="{28A0092B-C50C-407E-A947-70E740481C1C}">
+                <a14:useLocalDpi xmlns:a14="http://schemas.microsoft.com/office/drawing/2010/main" val="0"/>
+              </a:ext>
+            </a:extLst>
+          </a:blip>
+          <a:stretch>
+            <a:fillRect/>
+          </a:stretch>
+        </p:blipFill>
+        <p:spPr>
+          <a:xfrm>
+            <a:off x="29696214" y="10182377"/>
+            <a:ext cx="13900210" cy="8807695"/>
+          </a:xfrm>
+          <a:prstGeom prst="rect">
+            <a:avLst/>
+          </a:prstGeom>
+        </p:spPr>
+      </p:pic>
+      <p:pic>
+        <p:nvPicPr>
+          <p:cNvPr id="17" name="Picture 16">
+            <a:extLst>
+              <a:ext uri="{FF2B5EF4-FFF2-40B4-BE49-F238E27FC236}">
+                <a16:creationId xmlns:a16="http://schemas.microsoft.com/office/drawing/2014/main" id="{E7C9CDF6-E835-4DB3-8B4C-8438F0AE618A}"/>
+              </a:ext>
+            </a:extLst>
+          </p:cNvPr>
+          <p:cNvPicPr>
+            <a:picLocks noChangeAspect="1"/>
+          </p:cNvPicPr>
+          <p:nvPr/>
+        </p:nvPicPr>
+        <p:blipFill>
+          <a:blip r:embed="rId6">
+            <a:extLst>
+              <a:ext uri="{28A0092B-C50C-407E-A947-70E740481C1C}">
+                <a14:useLocalDpi xmlns:a14="http://schemas.microsoft.com/office/drawing/2010/main" val="0"/>
+              </a:ext>
+            </a:extLst>
+          </a:blip>
+          <a:stretch>
+            <a:fillRect/>
+          </a:stretch>
+        </p:blipFill>
+        <p:spPr>
+          <a:xfrm>
+            <a:off x="14824578" y="22757597"/>
+            <a:ext cx="14125203" cy="10160804"/>
+          </a:xfrm>
+          <a:prstGeom prst="rect">
+            <a:avLst/>
+          </a:prstGeom>
+        </p:spPr>
+      </p:pic>
+      <p:pic>
+        <p:nvPicPr>
+          <p:cNvPr id="19" name="Picture 18">
+            <a:extLst>
+              <a:ext uri="{FF2B5EF4-FFF2-40B4-BE49-F238E27FC236}">
+                <a16:creationId xmlns:a16="http://schemas.microsoft.com/office/drawing/2014/main" id="{790F6BFD-9BFA-42DB-8A0B-5ACA74AFA7C1}"/>
+              </a:ext>
+            </a:extLst>
+          </p:cNvPr>
+          <p:cNvPicPr>
+            <a:picLocks noChangeAspect="1"/>
           </p:cNvPicPr>
           <p:nvPr/>
         </p:nvPicPr>
@@ -4410,29 +4388,18 @@
               </a:ext>
             </a:extLst>
           </a:blip>
-          <a:srcRect/>
           <a:stretch>
             <a:fillRect/>
           </a:stretch>
         </p:blipFill>
-        <p:spPr bwMode="auto">
+        <p:spPr>
           <a:xfrm>
-            <a:off x="29382785" y="10494731"/>
-            <a:ext cx="13997220" cy="7994844"/>
+            <a:off x="14630401" y="13705878"/>
+            <a:ext cx="14467315" cy="9051718"/>
           </a:xfrm>
           <a:prstGeom prst="rect">
             <a:avLst/>
           </a:prstGeom>
-          <a:noFill/>
-          <a:extLst>
-            <a:ext uri="{909E8E84-426E-40DD-AFC4-6F175D3DCCD1}">
-              <a14:hiddenFill xmlns:a14="http://schemas.microsoft.com/office/drawing/2010/main">
-                <a:solidFill>
-                  <a:srgbClr val="FFFFFF"/>
-                </a:solidFill>
-              </a14:hiddenFill>
-            </a:ext>
-          </a:extLst>
         </p:spPr>
       </p:pic>
     </p:spTree>
@@ -4734,61 +4701,6 @@
 </file>
 
 <file path=customXml/item1.xml><?xml version="1.0" encoding="utf-8"?>
-<?mso-contentType ?>
-<FormTemplates xmlns="http://schemas.microsoft.com/sharepoint/v3/contenttype/forms">
-  <Display>DocumentLibraryForm</Display>
-  <Edit>DocumentLibraryForm</Edit>
-  <New>DocumentLibraryForm</New>
-</FormTemplates>
-</file>
-
-<file path=customXml/item2.xml><?xml version="1.0" encoding="utf-8"?>
-<?mso-contentType ?>
-<spe:Receivers xmlns:spe="http://schemas.microsoft.com/sharepoint/events">
-  <Receiver>
-    <Name>Document ID Generator</Name>
-    <Synchronization>Synchronous</Synchronization>
-    <Type>10001</Type>
-    <SequenceNumber>1000</SequenceNumber>
-    <Assembly>Microsoft.Office.DocumentManagement, Version=14.0.0.0, Culture=neutral, PublicKeyToken=71e9bce111e9429c</Assembly>
-    <Class>Microsoft.Office.DocumentManagement.Internal.DocIdHandler</Class>
-    <Data/>
-    <Filter/>
-  </Receiver>
-  <Receiver>
-    <Name>Document ID Generator</Name>
-    <Synchronization>Synchronous</Synchronization>
-    <Type>10002</Type>
-    <SequenceNumber>1001</SequenceNumber>
-    <Assembly>Microsoft.Office.DocumentManagement, Version=14.0.0.0, Culture=neutral, PublicKeyToken=71e9bce111e9429c</Assembly>
-    <Class>Microsoft.Office.DocumentManagement.Internal.DocIdHandler</Class>
-    <Data/>
-    <Filter/>
-  </Receiver>
-  <Receiver>
-    <Name>Document ID Generator</Name>
-    <Synchronization>Synchronous</Synchronization>
-    <Type>10004</Type>
-    <SequenceNumber>1002</SequenceNumber>
-    <Assembly>Microsoft.Office.DocumentManagement, Version=14.0.0.0, Culture=neutral, PublicKeyToken=71e9bce111e9429c</Assembly>
-    <Class>Microsoft.Office.DocumentManagement.Internal.DocIdHandler</Class>
-    <Data/>
-    <Filter/>
-  </Receiver>
-  <Receiver>
-    <Name>Document ID Generator</Name>
-    <Synchronization>Synchronous</Synchronization>
-    <Type>10006</Type>
-    <SequenceNumber>1003</SequenceNumber>
-    <Assembly>Microsoft.Office.DocumentManagement, Version=14.0.0.0, Culture=neutral, PublicKeyToken=71e9bce111e9429c</Assembly>
-    <Class>Microsoft.Office.DocumentManagement.Internal.DocIdHandler</Class>
-    <Data/>
-    <Filter/>
-  </Receiver>
-</spe:Receivers>
-</file>
-
-<file path=customXml/item3.xml><?xml version="1.0" encoding="utf-8"?>
 <ct:contentTypeSchema xmlns:ct="http://schemas.microsoft.com/office/2006/metadata/contentType" xmlns:ma="http://schemas.microsoft.com/office/2006/metadata/properties/metaAttributes" ct:_="" ma:_="" ma:contentTypeName="Document" ma:contentTypeID="0x010100198492E96F6ACC44BBBEB5EFA434EED1" ma:contentTypeVersion="1" ma:contentTypeDescription="Create a new document." ma:contentTypeScope="" ma:versionID="cf296b60bf990032323d1c6d41ae543b">
   <xsd:schema xmlns:xsd="http://www.w3.org/2001/XMLSchema" xmlns:xs="http://www.w3.org/2001/XMLSchema" xmlns:p="http://schemas.microsoft.com/office/2006/metadata/properties" xmlns:ns2="db534a5e-1222-4db9-a6da-47c142019016" targetNamespace="http://schemas.microsoft.com/office/2006/metadata/properties" ma:root="true" ma:fieldsID="491b76b6be48514c30ba3200299e7b7f" ns2:_="">
     <xsd:import namespace="db534a5e-1222-4db9-a6da-47c142019016"/>
@@ -4933,6 +4845,61 @@
 </ct:contentTypeSchema>
 </file>
 
+<file path=customXml/item2.xml><?xml version="1.0" encoding="utf-8"?>
+<?mso-contentType ?>
+<spe:Receivers xmlns:spe="http://schemas.microsoft.com/sharepoint/events">
+  <Receiver>
+    <Name>Document ID Generator</Name>
+    <Synchronization>Synchronous</Synchronization>
+    <Type>10001</Type>
+    <SequenceNumber>1000</SequenceNumber>
+    <Assembly>Microsoft.Office.DocumentManagement, Version=14.0.0.0, Culture=neutral, PublicKeyToken=71e9bce111e9429c</Assembly>
+    <Class>Microsoft.Office.DocumentManagement.Internal.DocIdHandler</Class>
+    <Data/>
+    <Filter/>
+  </Receiver>
+  <Receiver>
+    <Name>Document ID Generator</Name>
+    <Synchronization>Synchronous</Synchronization>
+    <Type>10002</Type>
+    <SequenceNumber>1001</SequenceNumber>
+    <Assembly>Microsoft.Office.DocumentManagement, Version=14.0.0.0, Culture=neutral, PublicKeyToken=71e9bce111e9429c</Assembly>
+    <Class>Microsoft.Office.DocumentManagement.Internal.DocIdHandler</Class>
+    <Data/>
+    <Filter/>
+  </Receiver>
+  <Receiver>
+    <Name>Document ID Generator</Name>
+    <Synchronization>Synchronous</Synchronization>
+    <Type>10004</Type>
+    <SequenceNumber>1002</SequenceNumber>
+    <Assembly>Microsoft.Office.DocumentManagement, Version=14.0.0.0, Culture=neutral, PublicKeyToken=71e9bce111e9429c</Assembly>
+    <Class>Microsoft.Office.DocumentManagement.Internal.DocIdHandler</Class>
+    <Data/>
+    <Filter/>
+  </Receiver>
+  <Receiver>
+    <Name>Document ID Generator</Name>
+    <Synchronization>Synchronous</Synchronization>
+    <Type>10006</Type>
+    <SequenceNumber>1003</SequenceNumber>
+    <Assembly>Microsoft.Office.DocumentManagement, Version=14.0.0.0, Culture=neutral, PublicKeyToken=71e9bce111e9429c</Assembly>
+    <Class>Microsoft.Office.DocumentManagement.Internal.DocIdHandler</Class>
+    <Data/>
+    <Filter/>
+  </Receiver>
+</spe:Receivers>
+</file>
+
+<file path=customXml/item3.xml><?xml version="1.0" encoding="utf-8"?>
+<?mso-contentType ?>
+<FormTemplates xmlns="http://schemas.microsoft.com/sharepoint/v3/contenttype/forms">
+  <Display>DocumentLibraryForm</Display>
+  <Edit>DocumentLibraryForm</Edit>
+  <New>DocumentLibraryForm</New>
+</FormTemplates>
+</file>
+
 <file path=customXml/item4.xml><?xml version="1.0" encoding="utf-8"?>
 <p:properties xmlns:p="http://schemas.microsoft.com/office/2006/metadata/properties" xmlns:xsi="http://www.w3.org/2001/XMLSchema-instance" xmlns:pc="http://schemas.microsoft.com/office/infopath/2007/PartnerControls">
   <documentManagement>
@@ -4946,22 +4913,6 @@
 </file>
 
 <file path=customXml/itemProps1.xml><?xml version="1.0" encoding="utf-8"?>
-<ds:datastoreItem xmlns:ds="http://schemas.openxmlformats.org/officeDocument/2006/customXml" ds:itemID="{507C3C16-BC59-4883-ABE4-0911E3FE1B90}">
-  <ds:schemaRefs>
-    <ds:schemaRef ds:uri="http://schemas.microsoft.com/sharepoint/v3/contenttype/forms"/>
-  </ds:schemaRefs>
-</ds:datastoreItem>
-</file>
-
-<file path=customXml/itemProps2.xml><?xml version="1.0" encoding="utf-8"?>
-<ds:datastoreItem xmlns:ds="http://schemas.openxmlformats.org/officeDocument/2006/customXml" ds:itemID="{CA62BF48-A576-4D85-A587-1744F931CE21}">
-  <ds:schemaRefs>
-    <ds:schemaRef ds:uri="http://schemas.microsoft.com/sharepoint/events"/>
-  </ds:schemaRefs>
-</ds:datastoreItem>
-</file>
-
-<file path=customXml/itemProps3.xml><?xml version="1.0" encoding="utf-8"?>
 <ds:datastoreItem xmlns:ds="http://schemas.openxmlformats.org/officeDocument/2006/customXml" ds:itemID="{081FD53D-2ABA-4B69-925F-BDB723FA0A79}">
   <ds:schemaRefs>
     <ds:schemaRef ds:uri="http://schemas.microsoft.com/office/2006/metadata/contentType"/>
@@ -4979,6 +4930,22 @@
 </ds:datastoreItem>
 </file>
 
+<file path=customXml/itemProps2.xml><?xml version="1.0" encoding="utf-8"?>
+<ds:datastoreItem xmlns:ds="http://schemas.openxmlformats.org/officeDocument/2006/customXml" ds:itemID="{CA62BF48-A576-4D85-A587-1744F931CE21}">
+  <ds:schemaRefs>
+    <ds:schemaRef ds:uri="http://schemas.microsoft.com/sharepoint/events"/>
+  </ds:schemaRefs>
+</ds:datastoreItem>
+</file>
+
+<file path=customXml/itemProps3.xml><?xml version="1.0" encoding="utf-8"?>
+<ds:datastoreItem xmlns:ds="http://schemas.openxmlformats.org/officeDocument/2006/customXml" ds:itemID="{507C3C16-BC59-4883-ABE4-0911E3FE1B90}">
+  <ds:schemaRefs>
+    <ds:schemaRef ds:uri="http://schemas.microsoft.com/sharepoint/v3/contenttype/forms"/>
+  </ds:schemaRefs>
+</ds:datastoreItem>
+</file>
+
 <file path=customXml/itemProps4.xml><?xml version="1.0" encoding="utf-8"?>
 <ds:datastoreItem xmlns:ds="http://schemas.openxmlformats.org/officeDocument/2006/customXml" ds:itemID="{188DB492-5879-4998-90FC-E865BEF428C1}">
   <ds:schemaRefs>

</xml_diff>